<commit_message>
Added more diagrams 1st phase Buyout doc completed
</commit_message>
<xml_diff>
--- a/Documentation/HardwareDR/ServerAndCommsV2.pptx
+++ b/Documentation/HardwareDR/ServerAndCommsV2.pptx
@@ -264,7 +264,7 @@
           <a:p>
             <a:fld id="{507C1A4B-A2B4-489A-80F7-993AC46C8FDB}" type="datetimeFigureOut">
               <a:rPr lang="en-ZA" smtClean="0"/>
-              <a:t>2018/11/27</a:t>
+              <a:t>2018/12/03</a:t>
             </a:fld>
             <a:endParaRPr lang="en-ZA"/>
           </a:p>
@@ -464,7 +464,7 @@
           <a:p>
             <a:fld id="{507C1A4B-A2B4-489A-80F7-993AC46C8FDB}" type="datetimeFigureOut">
               <a:rPr lang="en-ZA" smtClean="0"/>
-              <a:t>2018/11/27</a:t>
+              <a:t>2018/12/03</a:t>
             </a:fld>
             <a:endParaRPr lang="en-ZA"/>
           </a:p>
@@ -674,7 +674,7 @@
           <a:p>
             <a:fld id="{507C1A4B-A2B4-489A-80F7-993AC46C8FDB}" type="datetimeFigureOut">
               <a:rPr lang="en-ZA" smtClean="0"/>
-              <a:t>2018/11/27</a:t>
+              <a:t>2018/12/03</a:t>
             </a:fld>
             <a:endParaRPr lang="en-ZA"/>
           </a:p>
@@ -874,7 +874,7 @@
           <a:p>
             <a:fld id="{507C1A4B-A2B4-489A-80F7-993AC46C8FDB}" type="datetimeFigureOut">
               <a:rPr lang="en-ZA" smtClean="0"/>
-              <a:t>2018/11/27</a:t>
+              <a:t>2018/12/03</a:t>
             </a:fld>
             <a:endParaRPr lang="en-ZA"/>
           </a:p>
@@ -1150,7 +1150,7 @@
           <a:p>
             <a:fld id="{507C1A4B-A2B4-489A-80F7-993AC46C8FDB}" type="datetimeFigureOut">
               <a:rPr lang="en-ZA" smtClean="0"/>
-              <a:t>2018/11/27</a:t>
+              <a:t>2018/12/03</a:t>
             </a:fld>
             <a:endParaRPr lang="en-ZA"/>
           </a:p>
@@ -1418,7 +1418,7 @@
           <a:p>
             <a:fld id="{507C1A4B-A2B4-489A-80F7-993AC46C8FDB}" type="datetimeFigureOut">
               <a:rPr lang="en-ZA" smtClean="0"/>
-              <a:t>2018/11/27</a:t>
+              <a:t>2018/12/03</a:t>
             </a:fld>
             <a:endParaRPr lang="en-ZA"/>
           </a:p>
@@ -1833,7 +1833,7 @@
           <a:p>
             <a:fld id="{507C1A4B-A2B4-489A-80F7-993AC46C8FDB}" type="datetimeFigureOut">
               <a:rPr lang="en-ZA" smtClean="0"/>
-              <a:t>2018/11/27</a:t>
+              <a:t>2018/12/03</a:t>
             </a:fld>
             <a:endParaRPr lang="en-ZA"/>
           </a:p>
@@ -1975,7 +1975,7 @@
           <a:p>
             <a:fld id="{507C1A4B-A2B4-489A-80F7-993AC46C8FDB}" type="datetimeFigureOut">
               <a:rPr lang="en-ZA" smtClean="0"/>
-              <a:t>2018/11/27</a:t>
+              <a:t>2018/12/03</a:t>
             </a:fld>
             <a:endParaRPr lang="en-ZA"/>
           </a:p>
@@ -2088,7 +2088,7 @@
           <a:p>
             <a:fld id="{507C1A4B-A2B4-489A-80F7-993AC46C8FDB}" type="datetimeFigureOut">
               <a:rPr lang="en-ZA" smtClean="0"/>
-              <a:t>2018/11/27</a:t>
+              <a:t>2018/12/03</a:t>
             </a:fld>
             <a:endParaRPr lang="en-ZA"/>
           </a:p>
@@ -2401,7 +2401,7 @@
           <a:p>
             <a:fld id="{507C1A4B-A2B4-489A-80F7-993AC46C8FDB}" type="datetimeFigureOut">
               <a:rPr lang="en-ZA" smtClean="0"/>
-              <a:t>2018/11/27</a:t>
+              <a:t>2018/12/03</a:t>
             </a:fld>
             <a:endParaRPr lang="en-ZA"/>
           </a:p>
@@ -2690,7 +2690,7 @@
           <a:p>
             <a:fld id="{507C1A4B-A2B4-489A-80F7-993AC46C8FDB}" type="datetimeFigureOut">
               <a:rPr lang="en-ZA" smtClean="0"/>
-              <a:t>2018/11/27</a:t>
+              <a:t>2018/12/03</a:t>
             </a:fld>
             <a:endParaRPr lang="en-ZA"/>
           </a:p>
@@ -2933,7 +2933,7 @@
           <a:p>
             <a:fld id="{507C1A4B-A2B4-489A-80F7-993AC46C8FDB}" type="datetimeFigureOut">
               <a:rPr lang="en-ZA" smtClean="0"/>
-              <a:t>2018/11/27</a:t>
+              <a:t>2018/12/03</a:t>
             </a:fld>
             <a:endParaRPr lang="en-ZA"/>
           </a:p>
@@ -3350,6 +3350,48 @@
           <a:chExt cx="0" cy="0"/>
         </a:xfrm>
       </p:grpSpPr>
+      <p:cxnSp>
+        <p:nvCxnSpPr>
+          <p:cNvPr id="23" name="Straight Arrow Connector 22">
+            <a:extLst>
+              <a:ext uri="{FF2B5EF4-FFF2-40B4-BE49-F238E27FC236}">
+                <a16:creationId xmlns:a16="http://schemas.microsoft.com/office/drawing/2014/main" id="{9891E9C3-BE3F-44B9-992C-B593565FD9D6}"/>
+              </a:ext>
+            </a:extLst>
+          </p:cNvPr>
+          <p:cNvCxnSpPr>
+            <a:cxnSpLocks/>
+          </p:cNvCxnSpPr>
+          <p:nvPr/>
+        </p:nvCxnSpPr>
+        <p:spPr>
+          <a:xfrm flipH="1">
+            <a:off x="8723144" y="1662423"/>
+            <a:ext cx="1004157" cy="2078589"/>
+          </a:xfrm>
+          <a:prstGeom prst="straightConnector1">
+            <a:avLst/>
+          </a:prstGeom>
+          <a:ln>
+            <a:headEnd type="triangle"/>
+            <a:tailEnd type="triangle"/>
+          </a:ln>
+        </p:spPr>
+        <p:style>
+          <a:lnRef idx="1">
+            <a:schemeClr val="accent1"/>
+          </a:lnRef>
+          <a:fillRef idx="0">
+            <a:schemeClr val="accent1"/>
+          </a:fillRef>
+          <a:effectRef idx="0">
+            <a:schemeClr val="accent1"/>
+          </a:effectRef>
+          <a:fontRef idx="minor">
+            <a:schemeClr val="tx1"/>
+          </a:fontRef>
+        </p:style>
+      </p:cxnSp>
       <p:sp>
         <p:nvSpPr>
           <p:cNvPr id="32" name="Rectangle 31">
@@ -5027,6 +5069,175 @@
           </a:p>
         </p:txBody>
       </p:sp>
+      <p:cxnSp>
+        <p:nvCxnSpPr>
+          <p:cNvPr id="6" name="Straight Arrow Connector 5">
+            <a:extLst>
+              <a:ext uri="{FF2B5EF4-FFF2-40B4-BE49-F238E27FC236}">
+                <a16:creationId xmlns:a16="http://schemas.microsoft.com/office/drawing/2014/main" id="{B3CDD94F-7444-46B6-B703-65E85F46B49C}"/>
+              </a:ext>
+            </a:extLst>
+          </p:cNvPr>
+          <p:cNvCxnSpPr>
+            <a:cxnSpLocks/>
+            <a:stCxn id="22" idx="2"/>
+          </p:cNvCxnSpPr>
+          <p:nvPr/>
+        </p:nvCxnSpPr>
+        <p:spPr>
+          <a:xfrm>
+            <a:off x="1282820" y="1543506"/>
+            <a:ext cx="1159934" cy="1146743"/>
+          </a:xfrm>
+          <a:prstGeom prst="straightConnector1">
+            <a:avLst/>
+          </a:prstGeom>
+          <a:ln>
+            <a:headEnd type="triangle"/>
+            <a:tailEnd type="triangle"/>
+          </a:ln>
+        </p:spPr>
+        <p:style>
+          <a:lnRef idx="1">
+            <a:schemeClr val="accent1"/>
+          </a:lnRef>
+          <a:fillRef idx="0">
+            <a:schemeClr val="accent1"/>
+          </a:fillRef>
+          <a:effectRef idx="0">
+            <a:schemeClr val="accent1"/>
+          </a:effectRef>
+          <a:fontRef idx="minor">
+            <a:schemeClr val="tx1"/>
+          </a:fontRef>
+        </p:style>
+      </p:cxnSp>
+      <p:sp>
+        <p:nvSpPr>
+          <p:cNvPr id="22" name="Speech Bubble: Rectangle with Corners Rounded 21">
+            <a:extLst>
+              <a:ext uri="{FF2B5EF4-FFF2-40B4-BE49-F238E27FC236}">
+                <a16:creationId xmlns:a16="http://schemas.microsoft.com/office/drawing/2014/main" id="{D2BBDD8F-F156-4EBC-8C1F-DA9AF063CC98}"/>
+              </a:ext>
+            </a:extLst>
+          </p:cNvPr>
+          <p:cNvSpPr/>
+          <p:nvPr/>
+        </p:nvSpPr>
+        <p:spPr>
+          <a:xfrm>
+            <a:off x="224736" y="1215846"/>
+            <a:ext cx="2116167" cy="327660"/>
+          </a:xfrm>
+          <a:prstGeom prst="wedgeRoundRectCallout">
+            <a:avLst>
+              <a:gd name="adj1" fmla="val -24167"/>
+              <a:gd name="adj2" fmla="val 36876"/>
+              <a:gd name="adj3" fmla="val 16667"/>
+            </a:avLst>
+          </a:prstGeom>
+          <a:solidFill>
+            <a:schemeClr val="accent4">
+              <a:lumMod val="40000"/>
+              <a:lumOff val="60000"/>
+            </a:schemeClr>
+          </a:solidFill>
+        </p:spPr>
+        <p:style>
+          <a:lnRef idx="2">
+            <a:schemeClr val="accent1">
+              <a:shade val="50000"/>
+            </a:schemeClr>
+          </a:lnRef>
+          <a:fillRef idx="1">
+            <a:schemeClr val="accent1"/>
+          </a:fillRef>
+          <a:effectRef idx="0">
+            <a:schemeClr val="accent1"/>
+          </a:effectRef>
+          <a:fontRef idx="minor">
+            <a:schemeClr val="lt1"/>
+          </a:fontRef>
+        </p:style>
+        <p:txBody>
+          <a:bodyPr rtlCol="0" anchor="ctr"/>
+          <a:lstStyle/>
+          <a:p>
+            <a:pPr algn="ctr"/>
+            <a:r>
+              <a:rPr lang="en-ZA" sz="1200" b="1" dirty="0">
+                <a:solidFill>
+                  <a:srgbClr val="0070C0"/>
+                </a:solidFill>
+              </a:rPr>
+              <a:t>MOTUS</a:t>
+            </a:r>
+          </a:p>
+        </p:txBody>
+      </p:sp>
+      <p:sp>
+        <p:nvSpPr>
+          <p:cNvPr id="24" name="Speech Bubble: Rectangle with Corners Rounded 23">
+            <a:extLst>
+              <a:ext uri="{FF2B5EF4-FFF2-40B4-BE49-F238E27FC236}">
+                <a16:creationId xmlns:a16="http://schemas.microsoft.com/office/drawing/2014/main" id="{3089D4A2-4059-4C75-8B1A-3E7C380336D9}"/>
+              </a:ext>
+            </a:extLst>
+          </p:cNvPr>
+          <p:cNvSpPr/>
+          <p:nvPr/>
+        </p:nvSpPr>
+        <p:spPr>
+          <a:xfrm>
+            <a:off x="8964072" y="1334663"/>
+            <a:ext cx="2116167" cy="327660"/>
+          </a:xfrm>
+          <a:prstGeom prst="wedgeRoundRectCallout">
+            <a:avLst>
+              <a:gd name="adj1" fmla="val -24167"/>
+              <a:gd name="adj2" fmla="val 36876"/>
+              <a:gd name="adj3" fmla="val 16667"/>
+            </a:avLst>
+          </a:prstGeom>
+          <a:solidFill>
+            <a:schemeClr val="accent4">
+              <a:lumMod val="40000"/>
+              <a:lumOff val="60000"/>
+            </a:schemeClr>
+          </a:solidFill>
+        </p:spPr>
+        <p:style>
+          <a:lnRef idx="2">
+            <a:schemeClr val="accent1">
+              <a:shade val="50000"/>
+            </a:schemeClr>
+          </a:lnRef>
+          <a:fillRef idx="1">
+            <a:schemeClr val="accent1"/>
+          </a:fillRef>
+          <a:effectRef idx="0">
+            <a:schemeClr val="accent1"/>
+          </a:effectRef>
+          <a:fontRef idx="minor">
+            <a:schemeClr val="lt1"/>
+          </a:fontRef>
+        </p:style>
+        <p:txBody>
+          <a:bodyPr rtlCol="0" anchor="ctr"/>
+          <a:lstStyle/>
+          <a:p>
+            <a:pPr algn="ctr"/>
+            <a:r>
+              <a:rPr lang="en-ZA" sz="1200" b="1" dirty="0">
+                <a:solidFill>
+                  <a:srgbClr val="0070C0"/>
+                </a:solidFill>
+              </a:rPr>
+              <a:t>MOTUS</a:t>
+            </a:r>
+          </a:p>
+        </p:txBody>
+      </p:sp>
     </p:spTree>
     <p:extLst>
       <p:ext uri="{BB962C8B-B14F-4D97-AF65-F5344CB8AC3E}">

</xml_diff>